<commit_message>
Small tweaks to code and presentation
</commit_message>
<xml_diff>
--- a/presentation/async-all-the-things.pptx
+++ b/presentation/async-all-the-things.pptx
@@ -267,7 +267,7 @@
           <a:p>
             <a:fld id="{983D6D9B-0F8C-458B-B08B-036548941D12}" type="datetimeFigureOut">
               <a:rPr lang="pt-PT" smtClean="0"/>
-              <a:t>18/07/2019</a:t>
+              <a:t>22/07/2019</a:t>
             </a:fld>
             <a:endParaRPr lang="pt-PT"/>
           </a:p>
@@ -684,7 +684,7 @@
           <a:p>
             <a:fld id="{7BC5A0E7-DF1B-473A-B6BC-AADB43BDE17C}" type="datetime1">
               <a:rPr lang="pt-PT" smtClean="0"/>
-              <a:t>18/07/2019</a:t>
+              <a:t>22/07/2019</a:t>
             </a:fld>
             <a:endParaRPr lang="pt-PT"/>
           </a:p>
@@ -889,7 +889,7 @@
           <a:p>
             <a:fld id="{45E19FAD-9910-43AE-8B36-5EB93DB26C19}" type="datetime1">
               <a:rPr lang="pt-PT" smtClean="0"/>
-              <a:t>18/07/2019</a:t>
+              <a:t>22/07/2019</a:t>
             </a:fld>
             <a:endParaRPr lang="pt-PT"/>
           </a:p>
@@ -1099,7 +1099,7 @@
           <a:p>
             <a:fld id="{7B065CBB-26D4-47D5-9DCB-46F2A0891989}" type="datetime1">
               <a:rPr lang="pt-PT" smtClean="0"/>
-              <a:t>18/07/2019</a:t>
+              <a:t>22/07/2019</a:t>
             </a:fld>
             <a:endParaRPr lang="pt-PT"/>
           </a:p>
@@ -1304,7 +1304,7 @@
           <a:p>
             <a:fld id="{6A03AAA3-D668-488E-BC5C-16991DD8CD7A}" type="datetime1">
               <a:rPr lang="pt-PT" smtClean="0"/>
-              <a:t>18/07/2019</a:t>
+              <a:t>22/07/2019</a:t>
             </a:fld>
             <a:endParaRPr lang="pt-PT"/>
           </a:p>
@@ -1580,7 +1580,7 @@
           <a:p>
             <a:fld id="{0FDC295C-2D3B-433E-8BAF-F1774F278DC1}" type="datetime1">
               <a:rPr lang="pt-PT" smtClean="0"/>
-              <a:t>18/07/2019</a:t>
+              <a:t>22/07/2019</a:t>
             </a:fld>
             <a:endParaRPr lang="pt-PT"/>
           </a:p>
@@ -1853,7 +1853,7 @@
           <a:p>
             <a:fld id="{1C9899F1-CFF7-46D6-A1D4-C9F00D7AC3D9}" type="datetime1">
               <a:rPr lang="pt-PT" smtClean="0"/>
-              <a:t>18/07/2019</a:t>
+              <a:t>22/07/2019</a:t>
             </a:fld>
             <a:endParaRPr lang="pt-PT"/>
           </a:p>
@@ -2268,7 +2268,7 @@
           <a:p>
             <a:fld id="{F2ECEE4E-69DE-4832-BA99-F1C0B0845C33}" type="datetime1">
               <a:rPr lang="pt-PT" smtClean="0"/>
-              <a:t>18/07/2019</a:t>
+              <a:t>22/07/2019</a:t>
             </a:fld>
             <a:endParaRPr lang="pt-PT"/>
           </a:p>
@@ -2410,7 +2410,7 @@
           <a:p>
             <a:fld id="{F891F9D1-0A4B-47E6-979E-5BFE241942EF}" type="datetime1">
               <a:rPr lang="pt-PT" smtClean="0"/>
-              <a:t>18/07/2019</a:t>
+              <a:t>22/07/2019</a:t>
             </a:fld>
             <a:endParaRPr lang="pt-PT"/>
           </a:p>
@@ -2523,7 +2523,7 @@
           <a:p>
             <a:fld id="{366ABC13-341A-42B6-BB9C-8B17E77D78BD}" type="datetime1">
               <a:rPr lang="pt-PT" smtClean="0"/>
-              <a:t>18/07/2019</a:t>
+              <a:t>22/07/2019</a:t>
             </a:fld>
             <a:endParaRPr lang="pt-PT"/>
           </a:p>
@@ -2836,7 +2836,7 @@
           <a:p>
             <a:fld id="{056C69F2-C049-4C2F-8710-D854FCC26CA8}" type="datetime1">
               <a:rPr lang="pt-PT" smtClean="0"/>
-              <a:t>18/07/2019</a:t>
+              <a:t>22/07/2019</a:t>
             </a:fld>
             <a:endParaRPr lang="pt-PT"/>
           </a:p>
@@ -3125,7 +3125,7 @@
           <a:p>
             <a:fld id="{D5E56A50-1685-467C-806D-D8AE86523B3A}" type="datetime1">
               <a:rPr lang="pt-PT" smtClean="0"/>
-              <a:t>18/07/2019</a:t>
+              <a:t>22/07/2019</a:t>
             </a:fld>
             <a:endParaRPr lang="pt-PT"/>
           </a:p>
@@ -3368,7 +3368,7 @@
           <a:p>
             <a:fld id="{31D5F0EA-CD69-48E5-883C-BA5257F9C170}" type="datetime1">
               <a:rPr lang="pt-PT" smtClean="0"/>
-              <a:t>18/07/2019</a:t>
+              <a:t>22/07/2019</a:t>
             </a:fld>
             <a:endParaRPr lang="pt-PT"/>
           </a:p>
@@ -3865,93 +3865,6 @@
           </a:p>
         </p:txBody>
       </p:sp>
-      <p:sp>
-        <p:nvSpPr>
-          <p:cNvPr id="7" name="TextBox 6">
-            <a:extLst>
-              <a:ext uri="{FF2B5EF4-FFF2-40B4-BE49-F238E27FC236}">
-                <a16:creationId xmlns:a16="http://schemas.microsoft.com/office/drawing/2014/main" id="{40625949-CF48-4FBB-916A-84A690980604}"/>
-              </a:ext>
-            </a:extLst>
-          </p:cNvPr>
-          <p:cNvSpPr txBox="1"/>
-          <p:nvPr/>
-        </p:nvSpPr>
-        <p:spPr>
-          <a:xfrm>
-            <a:off x="328927" y="4793488"/>
-            <a:ext cx="6212427" cy="1477328"/>
-          </a:xfrm>
-          <a:prstGeom prst="rect">
-            <a:avLst/>
-          </a:prstGeom>
-          <a:noFill/>
-        </p:spPr>
-        <p:txBody>
-          <a:bodyPr wrap="square" rtlCol="0">
-            <a:spAutoFit/>
-          </a:bodyPr>
-          <a:lstStyle/>
-          <a:p>
-            <a:r>
-              <a:rPr lang="pt-PT" dirty="0"/>
-              <a:t>João Antunes</a:t>
-            </a:r>
-          </a:p>
-          <a:p>
-            <a:r>
-              <a:rPr lang="pt-PT" dirty="0"/>
-              <a:t>Twitter: </a:t>
-            </a:r>
-            <a:r>
-              <a:rPr lang="pt-PT" dirty="0">
-                <a:hlinkClick r:id="rId2"/>
-              </a:rPr>
-              <a:t>@joaofbantunes</a:t>
-            </a:r>
-            <a:endParaRPr lang="pt-PT" dirty="0"/>
-          </a:p>
-          <a:p>
-            <a:r>
-              <a:rPr lang="pt-PT" dirty="0"/>
-              <a:t>Site: </a:t>
-            </a:r>
-            <a:r>
-              <a:rPr lang="pt-PT" dirty="0">
-                <a:hlinkClick r:id="rId3"/>
-              </a:rPr>
-              <a:t>antunes.dev</a:t>
-            </a:r>
-            <a:endParaRPr lang="pt-PT" dirty="0"/>
-          </a:p>
-          <a:p>
-            <a:r>
-              <a:rPr lang="pt-PT" dirty="0"/>
-              <a:t>Blog: </a:t>
-            </a:r>
-            <a:r>
-              <a:rPr lang="pt-PT" dirty="0">
-                <a:hlinkClick r:id="rId4"/>
-              </a:rPr>
-              <a:t>blog.codingmilitia.com</a:t>
-            </a:r>
-            <a:endParaRPr lang="pt-PT" dirty="0"/>
-          </a:p>
-          <a:p>
-            <a:r>
-              <a:rPr lang="pt-PT" dirty="0"/>
-              <a:t>GitHub: </a:t>
-            </a:r>
-            <a:r>
-              <a:rPr lang="pt-PT" dirty="0">
-                <a:hlinkClick r:id="rId5"/>
-              </a:rPr>
-              <a:t>joaofbantunes</a:t>
-            </a:r>
-            <a:endParaRPr lang="pt-PT" dirty="0"/>
-          </a:p>
-        </p:txBody>
-      </p:sp>
     </p:spTree>
     <p:extLst>
       <p:ext uri="{BB962C8B-B14F-4D97-AF65-F5344CB8AC3E}">
@@ -8858,7 +8771,7 @@
         <p:spPr/>
         <p:txBody>
           <a:bodyPr>
-            <a:normAutofit fontScale="92500"/>
+            <a:normAutofit/>
           </a:bodyPr>
           <a:lstStyle/>
           <a:p>
@@ -10718,7 +10631,7 @@
         <p:spPr/>
         <p:txBody>
           <a:bodyPr>
-            <a:normAutofit fontScale="85000" lnSpcReduction="10000"/>
+            <a:normAutofit fontScale="92500" lnSpcReduction="20000"/>
           </a:bodyPr>
           <a:lstStyle/>
           <a:p>
@@ -12549,85 +12462,46 @@
           <a:p>
             <a:r>
               <a:rPr lang="pt-PT" dirty="0"/>
-              <a:t>Stephen </a:t>
-            </a:r>
-            <a:r>
-              <a:rPr lang="pt-PT" dirty="0" err="1"/>
-              <a:t>Toub's</a:t>
-            </a:r>
-            <a:r>
-              <a:rPr lang="pt-PT" dirty="0"/>
-              <a:t> "</a:t>
-            </a:r>
-            <a:r>
-              <a:rPr lang="pt-PT" dirty="0" err="1"/>
-              <a:t>Understanding</a:t>
-            </a:r>
-            <a:r>
-              <a:rPr lang="pt-PT" dirty="0"/>
-              <a:t> </a:t>
-            </a:r>
-            <a:r>
-              <a:rPr lang="pt-PT" dirty="0" err="1"/>
-              <a:t>the</a:t>
-            </a:r>
-            <a:r>
-              <a:rPr lang="pt-PT" dirty="0"/>
-              <a:t> </a:t>
-            </a:r>
-            <a:r>
-              <a:rPr lang="pt-PT" dirty="0" err="1"/>
-              <a:t>Whys</a:t>
-            </a:r>
-            <a:r>
-              <a:rPr lang="pt-PT" dirty="0"/>
-              <a:t>, </a:t>
-            </a:r>
-            <a:r>
-              <a:rPr lang="pt-PT" dirty="0" err="1"/>
-              <a:t>Whats</a:t>
-            </a:r>
-            <a:r>
-              <a:rPr lang="pt-PT" dirty="0"/>
-              <a:t>, </a:t>
-            </a:r>
-            <a:r>
-              <a:rPr lang="pt-PT" dirty="0" err="1"/>
-              <a:t>and</a:t>
-            </a:r>
-            <a:r>
-              <a:rPr lang="pt-PT" dirty="0"/>
-              <a:t> </a:t>
-            </a:r>
-            <a:r>
-              <a:rPr lang="pt-PT" dirty="0" err="1"/>
-              <a:t>Whens</a:t>
-            </a:r>
-            <a:r>
-              <a:rPr lang="pt-PT" dirty="0"/>
-              <a:t> </a:t>
-            </a:r>
-            <a:r>
-              <a:rPr lang="pt-PT" dirty="0" err="1"/>
-              <a:t>of</a:t>
-            </a:r>
-            <a:r>
-              <a:rPr lang="pt-PT" dirty="0"/>
-              <a:t> </a:t>
-            </a:r>
-            <a:r>
-              <a:rPr lang="pt-PT" dirty="0" err="1"/>
-              <a:t>ValueTask</a:t>
-            </a:r>
-            <a:r>
-              <a:rPr lang="pt-PT" dirty="0"/>
-              <a:t>" </a:t>
+              <a:t>Stephen Toub's "Understanding the Whys, Whats, and Whens of ValueTask" </a:t>
             </a:r>
             <a:r>
               <a:rPr lang="pt-PT" dirty="0">
                 <a:hlinkClick r:id="rId8"/>
               </a:rPr>
               <a:t>https://devblogs.microsoft.com/dotnet/understanding-the-whys-whats-and-whens-of-valuetask/</a:t>
+            </a:r>
+            <a:endParaRPr lang="pt-PT" dirty="0"/>
+          </a:p>
+          <a:p>
+            <a:r>
+              <a:rPr lang="en-US" sz="2900" dirty="0"/>
+              <a:t>Stephen </a:t>
+            </a:r>
+            <a:r>
+              <a:rPr lang="en-US" sz="2900" dirty="0" err="1"/>
+              <a:t>Toub’s</a:t>
+            </a:r>
+            <a:r>
+              <a:rPr lang="en-US" sz="2900" dirty="0"/>
+              <a:t>  “</a:t>
+            </a:r>
+            <a:r>
+              <a:rPr lang="pt-PT" sz="2900" dirty="0"/>
+              <a:t>ExecutionContext vs SynchronizationContext</a:t>
+            </a:r>
+            <a:r>
+              <a:rPr lang="en-US" sz="2900" dirty="0"/>
+              <a:t>”</a:t>
+            </a:r>
+            <a:r>
+              <a:rPr lang="en-US" dirty="0"/>
+              <a:t> </a:t>
+            </a:r>
+            <a:r>
+              <a:rPr lang="pt-PT" dirty="0">
+                <a:hlinkClick r:id="rId9"/>
+              </a:rPr>
+              <a:t>https://devblogs.microsoft.com/pfxteam/executioncontext-vs-synchronizationcontext/</a:t>
             </a:r>
             <a:endParaRPr lang="pt-PT" dirty="0"/>
           </a:p>

</xml_diff>

<commit_message>
Adding some new samples
</commit_message>
<xml_diff>
--- a/presentation/async-all-the-things.pptx
+++ b/presentation/async-all-the-things.pptx
@@ -270,7 +270,7 @@
           <a:p>
             <a:fld id="{983D6D9B-0F8C-458B-B08B-036548941D12}" type="datetimeFigureOut">
               <a:rPr lang="pt-PT" smtClean="0"/>
-              <a:t>24/07/2019</a:t>
+              <a:t>02/05/2021</a:t>
             </a:fld>
             <a:endParaRPr lang="pt-PT"/>
           </a:p>
@@ -687,7 +687,7 @@
           <a:p>
             <a:fld id="{7BC5A0E7-DF1B-473A-B6BC-AADB43BDE17C}" type="datetime1">
               <a:rPr lang="pt-PT" smtClean="0"/>
-              <a:t>24/07/2019</a:t>
+              <a:t>02/05/2021</a:t>
             </a:fld>
             <a:endParaRPr lang="pt-PT"/>
           </a:p>
@@ -892,7 +892,7 @@
           <a:p>
             <a:fld id="{45E19FAD-9910-43AE-8B36-5EB93DB26C19}" type="datetime1">
               <a:rPr lang="pt-PT" smtClean="0"/>
-              <a:t>24/07/2019</a:t>
+              <a:t>02/05/2021</a:t>
             </a:fld>
             <a:endParaRPr lang="pt-PT"/>
           </a:p>
@@ -1102,7 +1102,7 @@
           <a:p>
             <a:fld id="{7B065CBB-26D4-47D5-9DCB-46F2A0891989}" type="datetime1">
               <a:rPr lang="pt-PT" smtClean="0"/>
-              <a:t>24/07/2019</a:t>
+              <a:t>02/05/2021</a:t>
             </a:fld>
             <a:endParaRPr lang="pt-PT"/>
           </a:p>
@@ -1307,7 +1307,7 @@
           <a:p>
             <a:fld id="{6A03AAA3-D668-488E-BC5C-16991DD8CD7A}" type="datetime1">
               <a:rPr lang="pt-PT" smtClean="0"/>
-              <a:t>24/07/2019</a:t>
+              <a:t>02/05/2021</a:t>
             </a:fld>
             <a:endParaRPr lang="pt-PT"/>
           </a:p>
@@ -1583,7 +1583,7 @@
           <a:p>
             <a:fld id="{0FDC295C-2D3B-433E-8BAF-F1774F278DC1}" type="datetime1">
               <a:rPr lang="pt-PT" smtClean="0"/>
-              <a:t>24/07/2019</a:t>
+              <a:t>02/05/2021</a:t>
             </a:fld>
             <a:endParaRPr lang="pt-PT"/>
           </a:p>
@@ -1856,7 +1856,7 @@
           <a:p>
             <a:fld id="{1C9899F1-CFF7-46D6-A1D4-C9F00D7AC3D9}" type="datetime1">
               <a:rPr lang="pt-PT" smtClean="0"/>
-              <a:t>24/07/2019</a:t>
+              <a:t>02/05/2021</a:t>
             </a:fld>
             <a:endParaRPr lang="pt-PT"/>
           </a:p>
@@ -2271,7 +2271,7 @@
           <a:p>
             <a:fld id="{F2ECEE4E-69DE-4832-BA99-F1C0B0845C33}" type="datetime1">
               <a:rPr lang="pt-PT" smtClean="0"/>
-              <a:t>24/07/2019</a:t>
+              <a:t>02/05/2021</a:t>
             </a:fld>
             <a:endParaRPr lang="pt-PT"/>
           </a:p>
@@ -2413,7 +2413,7 @@
           <a:p>
             <a:fld id="{F891F9D1-0A4B-47E6-979E-5BFE241942EF}" type="datetime1">
               <a:rPr lang="pt-PT" smtClean="0"/>
-              <a:t>24/07/2019</a:t>
+              <a:t>02/05/2021</a:t>
             </a:fld>
             <a:endParaRPr lang="pt-PT"/>
           </a:p>
@@ -2526,7 +2526,7 @@
           <a:p>
             <a:fld id="{366ABC13-341A-42B6-BB9C-8B17E77D78BD}" type="datetime1">
               <a:rPr lang="pt-PT" smtClean="0"/>
-              <a:t>24/07/2019</a:t>
+              <a:t>02/05/2021</a:t>
             </a:fld>
             <a:endParaRPr lang="pt-PT"/>
           </a:p>
@@ -2839,7 +2839,7 @@
           <a:p>
             <a:fld id="{056C69F2-C049-4C2F-8710-D854FCC26CA8}" type="datetime1">
               <a:rPr lang="pt-PT" smtClean="0"/>
-              <a:t>24/07/2019</a:t>
+              <a:t>02/05/2021</a:t>
             </a:fld>
             <a:endParaRPr lang="pt-PT"/>
           </a:p>
@@ -3128,7 +3128,7 @@
           <a:p>
             <a:fld id="{D5E56A50-1685-467C-806D-D8AE86523B3A}" type="datetime1">
               <a:rPr lang="pt-PT" smtClean="0"/>
-              <a:t>24/07/2019</a:t>
+              <a:t>02/05/2021</a:t>
             </a:fld>
             <a:endParaRPr lang="pt-PT"/>
           </a:p>
@@ -3371,7 +3371,7 @@
           <a:p>
             <a:fld id="{31D5F0EA-CD69-48E5-883C-BA5257F9C170}" type="datetime1">
               <a:rPr lang="pt-PT" smtClean="0"/>
-              <a:t>24/07/2019</a:t>
+              <a:t>02/05/2021</a:t>
             </a:fld>
             <a:endParaRPr lang="pt-PT"/>
           </a:p>
@@ -4143,7 +4143,15 @@
             </a:r>
             <a:r>
               <a:rPr lang="pt-PT" dirty="0"/>
-              <a:t> implemente </a:t>
+              <a:t> </a:t>
+            </a:r>
+            <a:r>
+              <a:rPr lang="pt-PT" dirty="0" err="1"/>
+              <a:t>implement</a:t>
+            </a:r>
+            <a:r>
+              <a:rPr lang="pt-PT" dirty="0"/>
+              <a:t> </a:t>
             </a:r>
             <a:r>
               <a:rPr lang="pt-PT" dirty="0" err="1"/>

</xml_diff>